<commit_message>
Added additional slides to finish powerpoint
</commit_message>
<xml_diff>
--- a/Sprint 2.pptx
+++ b/Sprint 2.pptx
@@ -5,7 +5,7 @@
     <p:sldMasterId id="2147483792" r:id="rId1"/>
   </p:sldMasterIdLst>
   <p:notesMasterIdLst>
-    <p:notesMasterId r:id="rId11"/>
+    <p:notesMasterId r:id="rId12"/>
   </p:notesMasterIdLst>
   <p:sldIdLst>
     <p:sldId id="256" r:id="rId2"/>
@@ -15,8 +15,9 @@
     <p:sldId id="264" r:id="rId6"/>
     <p:sldId id="260" r:id="rId7"/>
     <p:sldId id="265" r:id="rId8"/>
-    <p:sldId id="257" r:id="rId9"/>
-    <p:sldId id="266" r:id="rId10"/>
+    <p:sldId id="267" r:id="rId9"/>
+    <p:sldId id="257" r:id="rId10"/>
+    <p:sldId id="266" r:id="rId11"/>
   </p:sldIdLst>
   <p:sldSz cx="12192000" cy="6858000"/>
   <p:notesSz cx="6858000" cy="9144000"/>
@@ -209,7 +210,7 @@
           <a:p>
             <a:fld id="{B084B4F0-EE30-094B-8017-9612FF0B1368}" type="datetimeFigureOut">
               <a:rPr lang="en-US" smtClean="0"/>
-              <a:t>9/17/2017</a:t>
+              <a:t>9/17/17</a:t>
             </a:fld>
             <a:endParaRPr lang="en-US"/>
           </a:p>
@@ -541,7 +542,7 @@
           <a:p>
             <a:fld id="{E5D72424-5B25-1D43-BEF7-581F57AACCB4}" type="slidenum">
               <a:rPr lang="en-US" smtClean="0"/>
-              <a:t>8</a:t>
+              <a:t>9</a:t>
             </a:fld>
             <a:endParaRPr lang="en-US"/>
           </a:p>
@@ -1282,7 +1283,7 @@
           <a:p>
             <a:fld id="{B149B49C-5221-2541-9EE8-2924ADA6EF19}" type="datetimeFigureOut">
               <a:rPr lang="en-US" smtClean="0"/>
-              <a:t>9/17/2017</a:t>
+              <a:t>9/17/17</a:t>
             </a:fld>
             <a:endParaRPr lang="en-US"/>
           </a:p>
@@ -1528,7 +1529,7 @@
           <a:p>
             <a:fld id="{B149B49C-5221-2541-9EE8-2924ADA6EF19}" type="datetimeFigureOut">
               <a:rPr lang="en-US" smtClean="0"/>
-              <a:t>9/17/2017</a:t>
+              <a:t>9/17/17</a:t>
             </a:fld>
             <a:endParaRPr lang="en-US"/>
           </a:p>
@@ -1837,7 +1838,7 @@
           <a:p>
             <a:fld id="{B149B49C-5221-2541-9EE8-2924ADA6EF19}" type="datetimeFigureOut">
               <a:rPr lang="en-US" smtClean="0"/>
-              <a:t>9/17/2017</a:t>
+              <a:t>9/17/17</a:t>
             </a:fld>
             <a:endParaRPr lang="en-US"/>
           </a:p>
@@ -2173,7 +2174,7 @@
           <a:p>
             <a:fld id="{B149B49C-5221-2541-9EE8-2924ADA6EF19}" type="datetimeFigureOut">
               <a:rPr lang="en-US" smtClean="0"/>
-              <a:t>9/17/2017</a:t>
+              <a:t>9/17/17</a:t>
             </a:fld>
             <a:endParaRPr lang="en-US"/>
           </a:p>
@@ -2482,7 +2483,7 @@
           <a:p>
             <a:fld id="{B149B49C-5221-2541-9EE8-2924ADA6EF19}" type="datetimeFigureOut">
               <a:rPr lang="en-US" smtClean="0"/>
-              <a:t>9/17/2017</a:t>
+              <a:t>9/17/17</a:t>
             </a:fld>
             <a:endParaRPr lang="en-US"/>
           </a:p>
@@ -2870,7 +2871,7 @@
           <a:p>
             <a:fld id="{B149B49C-5221-2541-9EE8-2924ADA6EF19}" type="datetimeFigureOut">
               <a:rPr lang="en-US" smtClean="0"/>
-              <a:t>9/17/2017</a:t>
+              <a:t>9/17/17</a:t>
             </a:fld>
             <a:endParaRPr lang="en-US"/>
           </a:p>
@@ -3035,7 +3036,7 @@
           <a:p>
             <a:fld id="{B149B49C-5221-2541-9EE8-2924ADA6EF19}" type="datetimeFigureOut">
               <a:rPr lang="en-US" smtClean="0"/>
-              <a:t>9/17/2017</a:t>
+              <a:t>9/17/17</a:t>
             </a:fld>
             <a:endParaRPr lang="en-US"/>
           </a:p>
@@ -3210,7 +3211,7 @@
           <a:p>
             <a:fld id="{B149B49C-5221-2541-9EE8-2924ADA6EF19}" type="datetimeFigureOut">
               <a:rPr lang="en-US" smtClean="0"/>
-              <a:t>9/17/2017</a:t>
+              <a:t>9/17/17</a:t>
             </a:fld>
             <a:endParaRPr lang="en-US"/>
           </a:p>
@@ -3381,7 +3382,7 @@
           <a:p>
             <a:fld id="{B149B49C-5221-2541-9EE8-2924ADA6EF19}" type="datetimeFigureOut">
               <a:rPr lang="en-US" smtClean="0"/>
-              <a:t>9/17/2017</a:t>
+              <a:t>9/17/17</a:t>
             </a:fld>
             <a:endParaRPr lang="en-US"/>
           </a:p>
@@ -3623,7 +3624,7 @@
           <a:p>
             <a:fld id="{B149B49C-5221-2541-9EE8-2924ADA6EF19}" type="datetimeFigureOut">
               <a:rPr lang="en-US" smtClean="0"/>
-              <a:t>9/17/2017</a:t>
+              <a:t>9/17/17</a:t>
             </a:fld>
             <a:endParaRPr lang="en-US"/>
           </a:p>
@@ -3850,7 +3851,7 @@
           <a:p>
             <a:fld id="{B149B49C-5221-2541-9EE8-2924ADA6EF19}" type="datetimeFigureOut">
               <a:rPr lang="en-US" smtClean="0"/>
-              <a:t>9/17/2017</a:t>
+              <a:t>9/17/17</a:t>
             </a:fld>
             <a:endParaRPr lang="en-US"/>
           </a:p>
@@ -4219,7 +4220,7 @@
           <a:p>
             <a:fld id="{B149B49C-5221-2541-9EE8-2924ADA6EF19}" type="datetimeFigureOut">
               <a:rPr lang="en-US" smtClean="0"/>
-              <a:t>9/17/2017</a:t>
+              <a:t>9/17/17</a:t>
             </a:fld>
             <a:endParaRPr lang="en-US"/>
           </a:p>
@@ -4337,7 +4338,7 @@
           <a:p>
             <a:fld id="{B149B49C-5221-2541-9EE8-2924ADA6EF19}" type="datetimeFigureOut">
               <a:rPr lang="en-US" smtClean="0"/>
-              <a:t>9/17/2017</a:t>
+              <a:t>9/17/17</a:t>
             </a:fld>
             <a:endParaRPr lang="en-US"/>
           </a:p>
@@ -4427,7 +4428,7 @@
           <a:p>
             <a:fld id="{B149B49C-5221-2541-9EE8-2924ADA6EF19}" type="datetimeFigureOut">
               <a:rPr lang="en-US" smtClean="0"/>
-              <a:t>9/17/2017</a:t>
+              <a:t>9/17/17</a:t>
             </a:fld>
             <a:endParaRPr lang="en-US"/>
           </a:p>
@@ -4677,7 +4678,7 @@
           <a:p>
             <a:fld id="{B149B49C-5221-2541-9EE8-2924ADA6EF19}" type="datetimeFigureOut">
               <a:rPr lang="en-US" smtClean="0"/>
-              <a:t>9/17/2017</a:t>
+              <a:t>9/17/17</a:t>
             </a:fld>
             <a:endParaRPr lang="en-US"/>
           </a:p>
@@ -4935,7 +4936,7 @@
           <a:p>
             <a:fld id="{B149B49C-5221-2541-9EE8-2924ADA6EF19}" type="datetimeFigureOut">
               <a:rPr lang="en-US" smtClean="0"/>
-              <a:t>9/17/2017</a:t>
+              <a:t>9/17/17</a:t>
             </a:fld>
             <a:endParaRPr lang="en-US"/>
           </a:p>
@@ -5673,7 +5674,7 @@
           <a:p>
             <a:fld id="{B149B49C-5221-2541-9EE8-2924ADA6EF19}" type="datetimeFigureOut">
               <a:rPr lang="en-US" smtClean="0"/>
-              <a:t>9/17/2017</a:t>
+              <a:t>9/17/17</a:t>
             </a:fld>
             <a:endParaRPr lang="en-US"/>
           </a:p>
@@ -6308,6 +6309,140 @@
 </p:sld>
 </file>
 
+<file path=ppt/slides/slide10.xml><?xml version="1.0" encoding="utf-8"?>
+<p:sld xmlns:a="http://schemas.openxmlformats.org/drawingml/2006/main" xmlns:r="http://schemas.openxmlformats.org/officeDocument/2006/relationships" xmlns:p="http://schemas.openxmlformats.org/presentationml/2006/main">
+  <p:cSld>
+    <p:spTree>
+      <p:nvGrpSpPr>
+        <p:cNvPr id="1" name=""/>
+        <p:cNvGrpSpPr/>
+        <p:nvPr/>
+      </p:nvGrpSpPr>
+      <p:grpSpPr>
+        <a:xfrm>
+          <a:off x="0" y="0"/>
+          <a:ext cx="0" cy="0"/>
+          <a:chOff x="0" y="0"/>
+          <a:chExt cx="0" cy="0"/>
+        </a:xfrm>
+      </p:grpSpPr>
+      <p:sp>
+        <p:nvSpPr>
+          <p:cNvPr id="2" name="Title 1">
+            <a:extLst>
+              <a:ext uri="{FF2B5EF4-FFF2-40B4-BE49-F238E27FC236}">
+                <a16:creationId xmlns:a16="http://schemas.microsoft.com/office/drawing/2014/main" xmlns="" id="{3DC66061-2811-42A3-999E-8CA00A02FE01}"/>
+              </a:ext>
+            </a:extLst>
+          </p:cNvPr>
+          <p:cNvSpPr>
+            <a:spLocks noGrp="1"/>
+          </p:cNvSpPr>
+          <p:nvPr>
+            <p:ph type="title"/>
+          </p:nvPr>
+        </p:nvSpPr>
+        <p:spPr/>
+        <p:txBody>
+          <a:bodyPr/>
+          <a:lstStyle/>
+          <a:p>
+            <a:r>
+              <a:rPr lang="en-US" dirty="0"/>
+              <a:t>Retrospective	</a:t>
+            </a:r>
+          </a:p>
+        </p:txBody>
+      </p:sp>
+      <p:sp>
+        <p:nvSpPr>
+          <p:cNvPr id="3" name="Content Placeholder 2">
+            <a:extLst>
+              <a:ext uri="{FF2B5EF4-FFF2-40B4-BE49-F238E27FC236}">
+                <a16:creationId xmlns:a16="http://schemas.microsoft.com/office/drawing/2014/main" xmlns="" id="{AFA64AAF-7F1F-4BA4-B3F9-C5E094C3DECA}"/>
+              </a:ext>
+            </a:extLst>
+          </p:cNvPr>
+          <p:cNvSpPr>
+            <a:spLocks noGrp="1"/>
+          </p:cNvSpPr>
+          <p:nvPr>
+            <p:ph idx="1"/>
+          </p:nvPr>
+        </p:nvSpPr>
+        <p:spPr/>
+        <p:txBody>
+          <a:bodyPr/>
+          <a:lstStyle/>
+          <a:p>
+            <a:r>
+              <a:rPr lang="en-US" dirty="0"/>
+              <a:t>What went </a:t>
+            </a:r>
+            <a:r>
+              <a:rPr lang="en-US" dirty="0" smtClean="0"/>
+              <a:t>well</a:t>
+            </a:r>
+          </a:p>
+          <a:p>
+            <a:pPr lvl="1"/>
+            <a:r>
+              <a:rPr lang="en-US" dirty="0" smtClean="0"/>
+              <a:t>Fast jump on spring framework, great communication with one and another.</a:t>
+            </a:r>
+            <a:endParaRPr lang="en-US" dirty="0"/>
+          </a:p>
+          <a:p>
+            <a:r>
+              <a:rPr lang="en-US" dirty="0"/>
+              <a:t>What could have gone </a:t>
+            </a:r>
+            <a:r>
+              <a:rPr lang="en-US" dirty="0" smtClean="0"/>
+              <a:t>better</a:t>
+            </a:r>
+          </a:p>
+          <a:p>
+            <a:pPr lvl="1"/>
+            <a:r>
+              <a:rPr lang="en-US" dirty="0" smtClean="0"/>
+              <a:t>Getting our cards done sooner rather then last minute.</a:t>
+            </a:r>
+            <a:endParaRPr lang="en-US" dirty="0"/>
+          </a:p>
+          <a:p>
+            <a:r>
+              <a:rPr lang="en-US" dirty="0"/>
+              <a:t>What we will commit to </a:t>
+            </a:r>
+            <a:r>
+              <a:rPr lang="en-US" dirty="0" smtClean="0"/>
+              <a:t>improve</a:t>
+            </a:r>
+          </a:p>
+          <a:p>
+            <a:pPr lvl="1"/>
+            <a:r>
+              <a:rPr lang="en-US" dirty="0" smtClean="0"/>
+              <a:t>Timing on getting tasks finished</a:t>
+            </a:r>
+            <a:endParaRPr lang="en-US" dirty="0"/>
+          </a:p>
+        </p:txBody>
+      </p:sp>
+    </p:spTree>
+    <p:extLst>
+      <p:ext uri="{BB962C8B-B14F-4D97-AF65-F5344CB8AC3E}">
+        <p14:creationId xmlns:p14="http://schemas.microsoft.com/office/powerpoint/2010/main" val="924390232"/>
+      </p:ext>
+    </p:extLst>
+  </p:cSld>
+  <p:clrMapOvr>
+    <a:masterClrMapping/>
+  </p:clrMapOvr>
+</p:sld>
+</file>
+
 <file path=ppt/slides/slide2.xml><?xml version="1.0" encoding="utf-8"?>
 <p:sld xmlns:a="http://schemas.openxmlformats.org/drawingml/2006/main" xmlns:r="http://schemas.openxmlformats.org/officeDocument/2006/relationships" xmlns:p="http://schemas.openxmlformats.org/presentationml/2006/main">
   <p:cSld>
@@ -6867,6 +7002,35 @@
           </a:xfrm>
         </p:spPr>
       </p:pic>
+      <p:pic>
+        <p:nvPicPr>
+          <p:cNvPr id="3" name="Picture 2"/>
+          <p:cNvPicPr>
+            <a:picLocks noChangeAspect="1"/>
+          </p:cNvPicPr>
+          <p:nvPr/>
+        </p:nvPicPr>
+        <p:blipFill rotWithShape="1">
+          <a:blip r:embed="rId3">
+            <a:extLst>
+              <a:ext uri="{28A0092B-C50C-407E-A947-70E740481C1C}">
+                <a14:useLocalDpi xmlns:a14="http://schemas.microsoft.com/office/drawing/2010/main" val="0"/>
+              </a:ext>
+            </a:extLst>
+          </a:blip>
+          <a:srcRect r="45569"/>
+          <a:stretch/>
+        </p:blipFill>
+        <p:spPr>
+          <a:xfrm>
+            <a:off x="6822563" y="1575412"/>
+            <a:ext cx="4522968" cy="3619653"/>
+          </a:xfrm>
+          <a:prstGeom prst="rect">
+            <a:avLst/>
+          </a:prstGeom>
+        </p:spPr>
+      </p:pic>
     </p:spTree>
     <p:extLst>
       <p:ext uri="{BB962C8B-B14F-4D97-AF65-F5344CB8AC3E}">
@@ -6912,22 +7076,24 @@
           <a:bodyPr/>
           <a:lstStyle/>
           <a:p>
+            <a:r>
+              <a:rPr lang="en-US" dirty="0" smtClean="0"/>
+              <a:t>Unit Test</a:t>
+            </a:r>
             <a:endParaRPr lang="en-US" dirty="0"/>
           </a:p>
         </p:txBody>
       </p:sp>
       <p:pic>
         <p:nvPicPr>
-          <p:cNvPr id="4" name="Content Placeholder 3"/>
+          <p:cNvPr id="4" name="Picture 3"/>
           <p:cNvPicPr>
-            <a:picLocks noGrp="1" noChangeAspect="1"/>
+            <a:picLocks noChangeAspect="1"/>
           </p:cNvPicPr>
-          <p:nvPr>
-            <p:ph idx="1"/>
-          </p:nvPr>
+          <p:nvPr/>
         </p:nvPicPr>
         <p:blipFill>
-          <a:blip r:embed="rId3">
+          <a:blip r:embed="rId2">
             <a:extLst>
               <a:ext uri="{28A0092B-C50C-407E-A947-70E740481C1C}">
                 <a14:useLocalDpi xmlns:a14="http://schemas.microsoft.com/office/drawing/2010/main" val="0"/>
@@ -6940,15 +7106,18 @@
         </p:blipFill>
         <p:spPr>
           <a:xfrm>
-            <a:off x="959070" y="2160588"/>
-            <a:ext cx="8033897" cy="3881437"/>
+            <a:off x="2864386" y="143219"/>
+            <a:ext cx="7142469" cy="6538511"/>
           </a:xfrm>
+          <a:prstGeom prst="rect">
+            <a:avLst/>
+          </a:prstGeom>
         </p:spPr>
       </p:pic>
     </p:spTree>
     <p:extLst>
       <p:ext uri="{BB962C8B-B14F-4D97-AF65-F5344CB8AC3E}">
-        <p14:creationId xmlns:p14="http://schemas.microsoft.com/office/powerpoint/2010/main" val="1854899305"/>
+        <p14:creationId xmlns:p14="http://schemas.microsoft.com/office/powerpoint/2010/main" val="714347772"/>
       </p:ext>
     </p:extLst>
   </p:cSld>
@@ -6977,81 +7146,60 @@
       </p:grpSpPr>
       <p:sp>
         <p:nvSpPr>
-          <p:cNvPr id="2" name="Title 1">
+          <p:cNvPr id="2" name="Title 1"/>
+          <p:cNvSpPr>
+            <a:spLocks noGrp="1"/>
+          </p:cNvSpPr>
+          <p:nvPr>
+            <p:ph type="title"/>
+          </p:nvPr>
+        </p:nvSpPr>
+        <p:spPr/>
+        <p:txBody>
+          <a:bodyPr/>
+          <a:lstStyle/>
+          <a:p>
+            <a:r>
+              <a:rPr lang="en-US" dirty="0" smtClean="0"/>
+              <a:t>Links</a:t>
+            </a:r>
+            <a:endParaRPr lang="en-US" dirty="0"/>
+          </a:p>
+        </p:txBody>
+      </p:sp>
+      <p:pic>
+        <p:nvPicPr>
+          <p:cNvPr id="4" name="Content Placeholder 3"/>
+          <p:cNvPicPr>
+            <a:picLocks noGrp="1" noChangeAspect="1"/>
+          </p:cNvPicPr>
+          <p:nvPr>
+            <p:ph idx="1"/>
+          </p:nvPr>
+        </p:nvPicPr>
+        <p:blipFill>
+          <a:blip r:embed="rId3">
             <a:extLst>
-              <a:ext uri="{FF2B5EF4-FFF2-40B4-BE49-F238E27FC236}">
-                <a16:creationId xmlns:a16="http://schemas.microsoft.com/office/drawing/2014/main" id="{3DC66061-2811-42A3-999E-8CA00A02FE01}"/>
+              <a:ext uri="{28A0092B-C50C-407E-A947-70E740481C1C}">
+                <a14:useLocalDpi xmlns:a14="http://schemas.microsoft.com/office/drawing/2010/main" val="0"/>
               </a:ext>
             </a:extLst>
-          </p:cNvPr>
-          <p:cNvSpPr>
-            <a:spLocks noGrp="1"/>
-          </p:cNvSpPr>
-          <p:nvPr>
-            <p:ph type="title"/>
-          </p:nvPr>
-        </p:nvSpPr>
-        <p:spPr/>
-        <p:txBody>
-          <a:bodyPr/>
-          <a:lstStyle/>
-          <a:p>
-            <a:r>
-              <a:rPr lang="en-US" dirty="0"/>
-              <a:t>Retrospective	</a:t>
-            </a:r>
-          </a:p>
-        </p:txBody>
-      </p:sp>
-      <p:sp>
-        <p:nvSpPr>
-          <p:cNvPr id="3" name="Content Placeholder 2">
-            <a:extLst>
-              <a:ext uri="{FF2B5EF4-FFF2-40B4-BE49-F238E27FC236}">
-                <a16:creationId xmlns:a16="http://schemas.microsoft.com/office/drawing/2014/main" id="{AFA64AAF-7F1F-4BA4-B3F9-C5E094C3DECA}"/>
-              </a:ext>
-            </a:extLst>
-          </p:cNvPr>
-          <p:cNvSpPr>
-            <a:spLocks noGrp="1"/>
-          </p:cNvSpPr>
-          <p:nvPr>
-            <p:ph idx="1"/>
-          </p:nvPr>
-        </p:nvSpPr>
-        <p:spPr/>
-        <p:txBody>
-          <a:bodyPr/>
-          <a:lstStyle/>
-          <a:p>
-            <a:r>
-              <a:rPr lang="en-US" dirty="0"/>
-              <a:t>What went well</a:t>
-            </a:r>
-          </a:p>
-          <a:p>
-            <a:r>
-              <a:rPr lang="en-US" dirty="0"/>
-              <a:t>What could have gone better</a:t>
-            </a:r>
-          </a:p>
-          <a:p>
-            <a:r>
-              <a:rPr lang="en-US" dirty="0"/>
-              <a:t>What we will commit </a:t>
-            </a:r>
-            <a:r>
-              <a:rPr lang="en-US"/>
-              <a:t>to improve</a:t>
-            </a:r>
-            <a:endParaRPr lang="en-US" dirty="0"/>
-          </a:p>
-        </p:txBody>
-      </p:sp>
+          </a:blip>
+          <a:stretch>
+            <a:fillRect/>
+          </a:stretch>
+        </p:blipFill>
+        <p:spPr>
+          <a:xfrm>
+            <a:off x="959070" y="2160588"/>
+            <a:ext cx="8033897" cy="3881437"/>
+          </a:xfrm>
+        </p:spPr>
+      </p:pic>
     </p:spTree>
     <p:extLst>
       <p:ext uri="{BB962C8B-B14F-4D97-AF65-F5344CB8AC3E}">
-        <p14:creationId xmlns:p14="http://schemas.microsoft.com/office/powerpoint/2010/main" val="924390232"/>
+        <p14:creationId xmlns:p14="http://schemas.microsoft.com/office/powerpoint/2010/main" val="1854899305"/>
       </p:ext>
     </p:extLst>
   </p:cSld>

</xml_diff>